<commit_message>
Finished the Wiring Diagram.pptx
</commit_message>
<xml_diff>
--- a/ChaprSVN/ChapX/Wiring Diagram.pptx
+++ b/ChaprSVN/ChapX/Wiring Diagram.pptx
@@ -6,6 +6,7 @@
   </p:sldMasterIdLst>
   <p:sldIdLst>
     <p:sldId id="257" r:id="rId2"/>
+    <p:sldId id="258" r:id="rId3"/>
   </p:sldIdLst>
   <p:sldSz cx="9144000" cy="6858000" type="screen4x3"/>
   <p:notesSz cx="6858000" cy="9144000"/>
@@ -104,6 +105,22 @@
       </a:defRPr>
     </a:lvl9pPr>
   </p:defaultTextStyle>
+  <p:extLst>
+    <p:ext uri="{EFAFB233-063F-42B5-8137-9DF3F51BA10A}">
+      <p15:sldGuideLst xmlns:p15="http://schemas.microsoft.com/office/powerpoint/2012/main">
+        <p15:guide id="1" orient="horz" pos="2160">
+          <p15:clr>
+            <a:srgbClr val="A4A3A4"/>
+          </p15:clr>
+        </p15:guide>
+        <p15:guide id="2" pos="2880">
+          <p15:clr>
+            <a:srgbClr val="A4A3A4"/>
+          </p15:clr>
+        </p15:guide>
+      </p15:sldGuideLst>
+    </p:ext>
+  </p:extLst>
 </p:presentation>
 </file>
 
@@ -288,7 +305,7 @@
           <a:p>
             <a:fld id="{A993F05E-E33D-45D4-B7DC-85158D89E11A}" type="datetimeFigureOut">
               <a:rPr lang="en-US" smtClean="0"/>
-              <a:t>1/21/2015</a:t>
+              <a:t>1/25/2015</a:t>
             </a:fld>
             <a:endParaRPr lang="en-US"/>
           </a:p>
@@ -453,7 +470,7 @@
           <a:p>
             <a:fld id="{A993F05E-E33D-45D4-B7DC-85158D89E11A}" type="datetimeFigureOut">
               <a:rPr lang="en-US" smtClean="0"/>
-              <a:t>1/21/2015</a:t>
+              <a:t>1/25/2015</a:t>
             </a:fld>
             <a:endParaRPr lang="en-US"/>
           </a:p>
@@ -628,7 +645,7 @@
           <a:p>
             <a:fld id="{A993F05E-E33D-45D4-B7DC-85158D89E11A}" type="datetimeFigureOut">
               <a:rPr lang="en-US" smtClean="0"/>
-              <a:t>1/21/2015</a:t>
+              <a:t>1/25/2015</a:t>
             </a:fld>
             <a:endParaRPr lang="en-US"/>
           </a:p>
@@ -793,7 +810,7 @@
           <a:p>
             <a:fld id="{A993F05E-E33D-45D4-B7DC-85158D89E11A}" type="datetimeFigureOut">
               <a:rPr lang="en-US" smtClean="0"/>
-              <a:t>1/21/2015</a:t>
+              <a:t>1/25/2015</a:t>
             </a:fld>
             <a:endParaRPr lang="en-US"/>
           </a:p>
@@ -1034,7 +1051,7 @@
           <a:p>
             <a:fld id="{A993F05E-E33D-45D4-B7DC-85158D89E11A}" type="datetimeFigureOut">
               <a:rPr lang="en-US" smtClean="0"/>
-              <a:t>1/21/2015</a:t>
+              <a:t>1/25/2015</a:t>
             </a:fld>
             <a:endParaRPr lang="en-US"/>
           </a:p>
@@ -1317,7 +1334,7 @@
           <a:p>
             <a:fld id="{A993F05E-E33D-45D4-B7DC-85158D89E11A}" type="datetimeFigureOut">
               <a:rPr lang="en-US" smtClean="0"/>
-              <a:t>1/21/2015</a:t>
+              <a:t>1/25/2015</a:t>
             </a:fld>
             <a:endParaRPr lang="en-US"/>
           </a:p>
@@ -1734,7 +1751,7 @@
           <a:p>
             <a:fld id="{A993F05E-E33D-45D4-B7DC-85158D89E11A}" type="datetimeFigureOut">
               <a:rPr lang="en-US" smtClean="0"/>
-              <a:t>1/21/2015</a:t>
+              <a:t>1/25/2015</a:t>
             </a:fld>
             <a:endParaRPr lang="en-US"/>
           </a:p>
@@ -1847,7 +1864,7 @@
           <a:p>
             <a:fld id="{A993F05E-E33D-45D4-B7DC-85158D89E11A}" type="datetimeFigureOut">
               <a:rPr lang="en-US" smtClean="0"/>
-              <a:t>1/21/2015</a:t>
+              <a:t>1/25/2015</a:t>
             </a:fld>
             <a:endParaRPr lang="en-US"/>
           </a:p>
@@ -1937,7 +1954,7 @@
           <a:p>
             <a:fld id="{A993F05E-E33D-45D4-B7DC-85158D89E11A}" type="datetimeFigureOut">
               <a:rPr lang="en-US" smtClean="0"/>
-              <a:t>1/21/2015</a:t>
+              <a:t>1/25/2015</a:t>
             </a:fld>
             <a:endParaRPr lang="en-US"/>
           </a:p>
@@ -2209,7 +2226,7 @@
           <a:p>
             <a:fld id="{A993F05E-E33D-45D4-B7DC-85158D89E11A}" type="datetimeFigureOut">
               <a:rPr lang="en-US" smtClean="0"/>
-              <a:t>1/21/2015</a:t>
+              <a:t>1/25/2015</a:t>
             </a:fld>
             <a:endParaRPr lang="en-US"/>
           </a:p>
@@ -2457,7 +2474,7 @@
           <a:p>
             <a:fld id="{A993F05E-E33D-45D4-B7DC-85158D89E11A}" type="datetimeFigureOut">
               <a:rPr lang="en-US" smtClean="0"/>
-              <a:t>1/21/2015</a:t>
+              <a:t>1/25/2015</a:t>
             </a:fld>
             <a:endParaRPr lang="en-US"/>
           </a:p>
@@ -2665,7 +2682,7 @@
           <a:p>
             <a:fld id="{A993F05E-E33D-45D4-B7DC-85158D89E11A}" type="datetimeFigureOut">
               <a:rPr lang="en-US" smtClean="0"/>
-              <a:t>1/21/2015</a:t>
+              <a:t>1/25/2015</a:t>
             </a:fld>
             <a:endParaRPr lang="en-US"/>
           </a:p>
@@ -3137,13 +3154,13 @@
         </p:spPr>
         <p:style>
           <a:lnRef idx="1">
-            <a:schemeClr val="accent1"/>
-          </a:lnRef>
-          <a:fillRef idx="0">
-            <a:schemeClr val="accent1"/>
-          </a:fillRef>
-          <a:effectRef idx="0">
-            <a:schemeClr val="accent1"/>
+            <a:schemeClr val="dk1"/>
+          </a:lnRef>
+          <a:fillRef idx="0">
+            <a:schemeClr val="dk1"/>
+          </a:fillRef>
+          <a:effectRef idx="0">
+            <a:schemeClr val="dk1"/>
           </a:effectRef>
           <a:fontRef idx="minor">
             <a:schemeClr val="tx1"/>
@@ -3168,13 +3185,13 @@
         </p:spPr>
         <p:style>
           <a:lnRef idx="1">
-            <a:schemeClr val="accent1"/>
-          </a:lnRef>
-          <a:fillRef idx="0">
-            <a:schemeClr val="accent1"/>
-          </a:fillRef>
-          <a:effectRef idx="0">
-            <a:schemeClr val="accent1"/>
+            <a:schemeClr val="dk1"/>
+          </a:lnRef>
+          <a:fillRef idx="0">
+            <a:schemeClr val="dk1"/>
+          </a:fillRef>
+          <a:effectRef idx="0">
+            <a:schemeClr val="dk1"/>
           </a:effectRef>
           <a:fontRef idx="minor">
             <a:schemeClr val="tx1"/>
@@ -3199,13 +3216,13 @@
         </p:spPr>
         <p:style>
           <a:lnRef idx="1">
-            <a:schemeClr val="accent1"/>
-          </a:lnRef>
-          <a:fillRef idx="0">
-            <a:schemeClr val="accent1"/>
-          </a:fillRef>
-          <a:effectRef idx="0">
-            <a:schemeClr val="accent1"/>
+            <a:schemeClr val="dk1"/>
+          </a:lnRef>
+          <a:fillRef idx="0">
+            <a:schemeClr val="dk1"/>
+          </a:fillRef>
+          <a:effectRef idx="0">
+            <a:schemeClr val="dk1"/>
           </a:effectRef>
           <a:fontRef idx="minor">
             <a:schemeClr val="tx1"/>
@@ -3230,13 +3247,13 @@
         </p:spPr>
         <p:style>
           <a:lnRef idx="1">
-            <a:schemeClr val="accent1"/>
-          </a:lnRef>
-          <a:fillRef idx="0">
-            <a:schemeClr val="accent1"/>
-          </a:fillRef>
-          <a:effectRef idx="0">
-            <a:schemeClr val="accent1"/>
+            <a:schemeClr val="accent6"/>
+          </a:lnRef>
+          <a:fillRef idx="0">
+            <a:schemeClr val="accent6"/>
+          </a:fillRef>
+          <a:effectRef idx="0">
+            <a:schemeClr val="accent6"/>
           </a:effectRef>
           <a:fontRef idx="minor">
             <a:schemeClr val="tx1"/>
@@ -3462,37 +3479,6 @@
       </p:cxnSp>
       <p:cxnSp>
         <p:nvCxnSpPr>
-          <p:cNvPr id="48" name="Straight Connector 47"/>
-          <p:cNvCxnSpPr/>
-          <p:nvPr/>
-        </p:nvCxnSpPr>
-        <p:spPr>
-          <a:xfrm>
-            <a:off x="2667000" y="4038600"/>
-            <a:ext cx="0" cy="609600"/>
-          </a:xfrm>
-          <a:prstGeom prst="line">
-            <a:avLst/>
-          </a:prstGeom>
-          <a:ln w="38100"/>
-        </p:spPr>
-        <p:style>
-          <a:lnRef idx="1">
-            <a:schemeClr val="accent3"/>
-          </a:lnRef>
-          <a:fillRef idx="0">
-            <a:schemeClr val="accent3"/>
-          </a:fillRef>
-          <a:effectRef idx="0">
-            <a:schemeClr val="accent3"/>
-          </a:effectRef>
-          <a:fontRef idx="minor">
-            <a:schemeClr val="tx1"/>
-          </a:fontRef>
-        </p:style>
-      </p:cxnSp>
-      <p:cxnSp>
-        <p:nvCxnSpPr>
           <p:cNvPr id="51" name="Straight Connector 50"/>
           <p:cNvCxnSpPr/>
           <p:nvPr/>
@@ -3509,13 +3495,13 @@
         </p:spPr>
         <p:style>
           <a:lnRef idx="1">
-            <a:schemeClr val="accent1"/>
-          </a:lnRef>
-          <a:fillRef idx="0">
-            <a:schemeClr val="accent1"/>
-          </a:fillRef>
-          <a:effectRef idx="0">
-            <a:schemeClr val="accent1"/>
+            <a:schemeClr val="dk1"/>
+          </a:lnRef>
+          <a:fillRef idx="0">
+            <a:schemeClr val="dk1"/>
+          </a:fillRef>
+          <a:effectRef idx="0">
+            <a:schemeClr val="dk1"/>
           </a:effectRef>
           <a:fontRef idx="minor">
             <a:schemeClr val="tx1"/>
@@ -3531,22 +3517,22 @@
         <p:spPr>
           <a:xfrm>
             <a:off x="5105400" y="2057400"/>
-            <a:ext cx="0" cy="838200"/>
-          </a:xfrm>
-          <a:prstGeom prst="line">
-            <a:avLst/>
-          </a:prstGeom>
-          <a:ln w="38100"/>
-        </p:spPr>
-        <p:style>
-          <a:lnRef idx="1">
-            <a:schemeClr val="accent1"/>
-          </a:lnRef>
-          <a:fillRef idx="0">
-            <a:schemeClr val="accent1"/>
-          </a:fillRef>
-          <a:effectRef idx="0">
-            <a:schemeClr val="accent1"/>
+            <a:ext cx="15081" cy="723900"/>
+          </a:xfrm>
+          <a:prstGeom prst="line">
+            <a:avLst/>
+          </a:prstGeom>
+          <a:ln w="38100"/>
+        </p:spPr>
+        <p:style>
+          <a:lnRef idx="1">
+            <a:schemeClr val="dk1"/>
+          </a:lnRef>
+          <a:fillRef idx="0">
+            <a:schemeClr val="dk1"/>
+          </a:fillRef>
+          <a:effectRef idx="0">
+            <a:schemeClr val="dk1"/>
           </a:effectRef>
           <a:fontRef idx="minor">
             <a:schemeClr val="tx1"/>
@@ -3571,13 +3557,13 @@
         </p:spPr>
         <p:style>
           <a:lnRef idx="1">
-            <a:schemeClr val="accent1"/>
-          </a:lnRef>
-          <a:fillRef idx="0">
-            <a:schemeClr val="accent1"/>
-          </a:fillRef>
-          <a:effectRef idx="0">
-            <a:schemeClr val="accent1"/>
+            <a:schemeClr val="accent4"/>
+          </a:lnRef>
+          <a:fillRef idx="0">
+            <a:schemeClr val="accent4"/>
+          </a:fillRef>
+          <a:effectRef idx="0">
+            <a:schemeClr val="accent4"/>
           </a:effectRef>
           <a:fontRef idx="minor">
             <a:schemeClr val="tx1"/>
@@ -3623,8 +3609,8 @@
         </p:nvCxnSpPr>
         <p:spPr>
           <a:xfrm flipV="1">
-            <a:off x="4800600" y="0"/>
-            <a:ext cx="0" cy="1447800"/>
+            <a:off x="4800600" y="152400"/>
+            <a:ext cx="0" cy="1295400"/>
           </a:xfrm>
           <a:prstGeom prst="line">
             <a:avLst/>
@@ -3664,13 +3650,13 @@
         </p:spPr>
         <p:style>
           <a:lnRef idx="1">
-            <a:schemeClr val="accent1"/>
-          </a:lnRef>
-          <a:fillRef idx="0">
-            <a:schemeClr val="accent1"/>
-          </a:fillRef>
-          <a:effectRef idx="0">
-            <a:schemeClr val="accent1"/>
+            <a:schemeClr val="accent4"/>
+          </a:lnRef>
+          <a:fillRef idx="0">
+            <a:schemeClr val="accent4"/>
+          </a:fillRef>
+          <a:effectRef idx="0">
+            <a:schemeClr val="accent4"/>
           </a:effectRef>
           <a:fontRef idx="minor">
             <a:schemeClr val="tx1"/>
@@ -3695,13 +3681,13 @@
         </p:spPr>
         <p:style>
           <a:lnRef idx="1">
-            <a:schemeClr val="accent1"/>
-          </a:lnRef>
-          <a:fillRef idx="0">
-            <a:schemeClr val="accent1"/>
-          </a:fillRef>
-          <a:effectRef idx="0">
-            <a:schemeClr val="accent1"/>
+            <a:schemeClr val="accent4"/>
+          </a:lnRef>
+          <a:fillRef idx="0">
+            <a:schemeClr val="accent4"/>
+          </a:fillRef>
+          <a:effectRef idx="0">
+            <a:schemeClr val="accent4"/>
           </a:effectRef>
           <a:fontRef idx="minor">
             <a:schemeClr val="tx1"/>
@@ -3726,13 +3712,13 @@
         </p:spPr>
         <p:style>
           <a:lnRef idx="1">
-            <a:schemeClr val="accent1"/>
-          </a:lnRef>
-          <a:fillRef idx="0">
-            <a:schemeClr val="accent1"/>
-          </a:fillRef>
-          <a:effectRef idx="0">
-            <a:schemeClr val="accent1"/>
+            <a:schemeClr val="accent6"/>
+          </a:lnRef>
+          <a:fillRef idx="0">
+            <a:schemeClr val="accent6"/>
+          </a:fillRef>
+          <a:effectRef idx="0">
+            <a:schemeClr val="accent6"/>
           </a:effectRef>
           <a:fontRef idx="minor">
             <a:schemeClr val="tx1"/>
@@ -3757,13 +3743,13 @@
         </p:spPr>
         <p:style>
           <a:lnRef idx="1">
-            <a:schemeClr val="accent1"/>
-          </a:lnRef>
-          <a:fillRef idx="0">
-            <a:schemeClr val="accent1"/>
-          </a:fillRef>
-          <a:effectRef idx="0">
-            <a:schemeClr val="accent1"/>
+            <a:schemeClr val="accent6"/>
+          </a:lnRef>
+          <a:fillRef idx="0">
+            <a:schemeClr val="accent6"/>
+          </a:fillRef>
+          <a:effectRef idx="0">
+            <a:schemeClr val="accent6"/>
           </a:effectRef>
           <a:fontRef idx="minor">
             <a:schemeClr val="tx1"/>
@@ -3788,13 +3774,13 @@
         </p:spPr>
         <p:style>
           <a:lnRef idx="1">
-            <a:schemeClr val="accent1"/>
-          </a:lnRef>
-          <a:fillRef idx="0">
-            <a:schemeClr val="accent1"/>
-          </a:fillRef>
-          <a:effectRef idx="0">
-            <a:schemeClr val="accent1"/>
+            <a:schemeClr val="dk1"/>
+          </a:lnRef>
+          <a:fillRef idx="0">
+            <a:schemeClr val="dk1"/>
+          </a:fillRef>
+          <a:effectRef idx="0">
+            <a:schemeClr val="dk1"/>
           </a:effectRef>
           <a:fontRef idx="minor">
             <a:schemeClr val="tx1"/>
@@ -3840,8 +3826,8 @@
         </p:nvCxnSpPr>
         <p:spPr>
           <a:xfrm flipV="1">
-            <a:off x="4419600" y="0"/>
-            <a:ext cx="0" cy="1219200"/>
+            <a:off x="4419600" y="419100"/>
+            <a:ext cx="0" cy="800101"/>
           </a:xfrm>
           <a:prstGeom prst="line">
             <a:avLst/>
@@ -3870,9 +3856,9 @@
           <p:nvPr/>
         </p:nvCxnSpPr>
         <p:spPr>
-          <a:xfrm flipV="1">
-            <a:off x="4953000" y="152400"/>
-            <a:ext cx="0" cy="533400"/>
+          <a:xfrm>
+            <a:off x="805074" y="6310119"/>
+            <a:ext cx="0" cy="547881"/>
           </a:xfrm>
           <a:prstGeom prst="straightConnector1">
             <a:avLst/>
@@ -3904,7 +3890,7 @@
         </p:nvSpPr>
         <p:spPr>
           <a:xfrm>
-            <a:off x="4800600" y="609600"/>
+            <a:off x="904339" y="6445508"/>
             <a:ext cx="1016432" cy="369332"/>
           </a:xfrm>
           <a:prstGeom prst="rect">
@@ -3948,13 +3934,13 @@
         </p:spPr>
         <p:style>
           <a:lnRef idx="1">
-            <a:schemeClr val="accent1"/>
-          </a:lnRef>
-          <a:fillRef idx="0">
-            <a:schemeClr val="accent1"/>
-          </a:fillRef>
-          <a:effectRef idx="0">
-            <a:schemeClr val="accent1"/>
+            <a:schemeClr val="dk1"/>
+          </a:lnRef>
+          <a:fillRef idx="0">
+            <a:schemeClr val="dk1"/>
+          </a:fillRef>
+          <a:effectRef idx="0">
+            <a:schemeClr val="dk1"/>
           </a:effectRef>
           <a:fontRef idx="minor">
             <a:schemeClr val="tx1"/>
@@ -3969,23 +3955,23 @@
         </p:nvCxnSpPr>
         <p:spPr>
           <a:xfrm flipV="1">
-            <a:off x="4679576" y="-17929"/>
-            <a:ext cx="0" cy="1344705"/>
-          </a:xfrm>
-          <a:prstGeom prst="line">
-            <a:avLst/>
-          </a:prstGeom>
-          <a:ln w="38100"/>
-        </p:spPr>
-        <p:style>
-          <a:lnRef idx="1">
-            <a:schemeClr val="accent1"/>
-          </a:lnRef>
-          <a:fillRef idx="0">
-            <a:schemeClr val="accent1"/>
-          </a:fillRef>
-          <a:effectRef idx="0">
-            <a:schemeClr val="accent1"/>
+            <a:off x="4679576" y="304800"/>
+            <a:ext cx="8965" cy="1021977"/>
+          </a:xfrm>
+          <a:prstGeom prst="line">
+            <a:avLst/>
+          </a:prstGeom>
+          <a:ln w="38100"/>
+        </p:spPr>
+        <p:style>
+          <a:lnRef idx="1">
+            <a:schemeClr val="dk1"/>
+          </a:lnRef>
+          <a:fillRef idx="0">
+            <a:schemeClr val="dk1"/>
+          </a:fillRef>
+          <a:effectRef idx="0">
+            <a:schemeClr val="dk1"/>
           </a:effectRef>
           <a:fontRef idx="minor">
             <a:schemeClr val="tx1"/>
@@ -4010,13 +3996,13 @@
         </p:spPr>
         <p:style>
           <a:lnRef idx="1">
-            <a:schemeClr val="accent1"/>
-          </a:lnRef>
-          <a:fillRef idx="0">
-            <a:schemeClr val="accent1"/>
-          </a:fillRef>
-          <a:effectRef idx="0">
-            <a:schemeClr val="accent1"/>
+            <a:schemeClr val="accent6"/>
+          </a:lnRef>
+          <a:fillRef idx="0">
+            <a:schemeClr val="accent6"/>
+          </a:fillRef>
+          <a:effectRef idx="0">
+            <a:schemeClr val="accent6"/>
           </a:effectRef>
           <a:fontRef idx="minor">
             <a:schemeClr val="tx1"/>
@@ -4103,13 +4089,13 @@
         </p:spPr>
         <p:style>
           <a:lnRef idx="1">
-            <a:schemeClr val="accent1"/>
-          </a:lnRef>
-          <a:fillRef idx="0">
-            <a:schemeClr val="accent1"/>
-          </a:fillRef>
-          <a:effectRef idx="0">
-            <a:schemeClr val="accent1"/>
+            <a:schemeClr val="accent6"/>
+          </a:lnRef>
+          <a:fillRef idx="0">
+            <a:schemeClr val="accent6"/>
+          </a:fillRef>
+          <a:effectRef idx="0">
+            <a:schemeClr val="accent6"/>
           </a:effectRef>
           <a:fontRef idx="minor">
             <a:schemeClr val="tx1"/>
@@ -4310,23 +4296,23 @@
         </p:nvCxnSpPr>
         <p:spPr>
           <a:xfrm flipH="1" flipV="1">
-            <a:off x="5280212" y="5728447"/>
-            <a:ext cx="1415864" cy="17511"/>
-          </a:xfrm>
-          <a:prstGeom prst="line">
-            <a:avLst/>
-          </a:prstGeom>
-          <a:ln w="38100"/>
-        </p:spPr>
-        <p:style>
-          <a:lnRef idx="1">
-            <a:schemeClr val="accent1"/>
-          </a:lnRef>
-          <a:fillRef idx="0">
-            <a:schemeClr val="accent1"/>
-          </a:fillRef>
-          <a:effectRef idx="0">
-            <a:schemeClr val="accent1"/>
+            <a:off x="5120481" y="5728447"/>
+            <a:ext cx="1575595" cy="17512"/>
+          </a:xfrm>
+          <a:prstGeom prst="line">
+            <a:avLst/>
+          </a:prstGeom>
+          <a:ln w="38100"/>
+        </p:spPr>
+        <p:style>
+          <a:lnRef idx="1">
+            <a:schemeClr val="dk1"/>
+          </a:lnRef>
+          <a:fillRef idx="0">
+            <a:schemeClr val="dk1"/>
+          </a:fillRef>
+          <a:effectRef idx="0">
+            <a:schemeClr val="dk1"/>
           </a:effectRef>
           <a:fontRef idx="minor">
             <a:schemeClr val="tx1"/>
@@ -4341,23 +4327,23 @@
         </p:nvCxnSpPr>
         <p:spPr>
           <a:xfrm>
-            <a:off x="5298281" y="2881313"/>
-            <a:ext cx="0" cy="2843213"/>
-          </a:xfrm>
-          <a:prstGeom prst="line">
-            <a:avLst/>
-          </a:prstGeom>
-          <a:ln w="38100"/>
-        </p:spPr>
-        <p:style>
-          <a:lnRef idx="1">
-            <a:schemeClr val="accent1"/>
-          </a:lnRef>
-          <a:fillRef idx="0">
-            <a:schemeClr val="accent1"/>
-          </a:fillRef>
-          <a:effectRef idx="0">
-            <a:schemeClr val="accent1"/>
+            <a:off x="5120481" y="3017044"/>
+            <a:ext cx="0" cy="2711403"/>
+          </a:xfrm>
+          <a:prstGeom prst="line">
+            <a:avLst/>
+          </a:prstGeom>
+          <a:ln w="38100"/>
+        </p:spPr>
+        <p:style>
+          <a:lnRef idx="1">
+            <a:schemeClr val="dk1"/>
+          </a:lnRef>
+          <a:fillRef idx="0">
+            <a:schemeClr val="dk1"/>
+          </a:fillRef>
+          <a:effectRef idx="0">
+            <a:schemeClr val="dk1"/>
           </a:effectRef>
           <a:fontRef idx="minor">
             <a:schemeClr val="tx1"/>
@@ -4426,7 +4412,1349 @@
           </a:fontRef>
         </p:style>
       </p:cxnSp>
+      <p:pic>
+        <p:nvPicPr>
+          <p:cNvPr id="2" name="Picture 1"/>
+          <p:cNvPicPr>
+            <a:picLocks noChangeAspect="1"/>
+          </p:cNvPicPr>
+          <p:nvPr/>
+        </p:nvPicPr>
+        <p:blipFill rotWithShape="1">
+          <a:blip r:embed="rId5"/>
+          <a:srcRect t="10586" r="13176" b="25897"/>
+          <a:stretch/>
+        </p:blipFill>
+        <p:spPr>
+          <a:xfrm>
+            <a:off x="1102733" y="4138245"/>
+            <a:ext cx="2366680" cy="2286001"/>
+          </a:xfrm>
+          <a:prstGeom prst="rect">
+            <a:avLst/>
+          </a:prstGeom>
+        </p:spPr>
+      </p:pic>
+      <p:cxnSp>
+        <p:nvCxnSpPr>
+          <p:cNvPr id="49" name="Straight Connector 48"/>
+          <p:cNvCxnSpPr/>
+          <p:nvPr/>
+        </p:nvCxnSpPr>
+        <p:spPr>
+          <a:xfrm>
+            <a:off x="552450" y="403114"/>
+            <a:ext cx="3858186" cy="18071"/>
+          </a:xfrm>
+          <a:prstGeom prst="line">
+            <a:avLst/>
+          </a:prstGeom>
+          <a:ln w="38100"/>
+        </p:spPr>
+        <p:style>
+          <a:lnRef idx="1">
+            <a:schemeClr val="accent1"/>
+          </a:lnRef>
+          <a:fillRef idx="0">
+            <a:schemeClr val="accent1"/>
+          </a:fillRef>
+          <a:effectRef idx="0">
+            <a:schemeClr val="accent1"/>
+          </a:effectRef>
+          <a:fontRef idx="minor">
+            <a:schemeClr val="tx1"/>
+          </a:fontRef>
+        </p:style>
+      </p:cxnSp>
+      <p:cxnSp>
+        <p:nvCxnSpPr>
+          <p:cNvPr id="56" name="Straight Connector 55"/>
+          <p:cNvCxnSpPr/>
+          <p:nvPr/>
+        </p:nvCxnSpPr>
+        <p:spPr>
+          <a:xfrm flipV="1">
+            <a:off x="547968" y="412149"/>
+            <a:ext cx="29138" cy="3615331"/>
+          </a:xfrm>
+          <a:prstGeom prst="line">
+            <a:avLst/>
+          </a:prstGeom>
+          <a:ln w="38100"/>
+        </p:spPr>
+        <p:style>
+          <a:lnRef idx="1">
+            <a:schemeClr val="accent1"/>
+          </a:lnRef>
+          <a:fillRef idx="0">
+            <a:schemeClr val="accent1"/>
+          </a:fillRef>
+          <a:effectRef idx="0">
+            <a:schemeClr val="accent1"/>
+          </a:effectRef>
+          <a:fontRef idx="minor">
+            <a:schemeClr val="tx1"/>
+          </a:fontRef>
+        </p:style>
+      </p:cxnSp>
+      <p:cxnSp>
+        <p:nvCxnSpPr>
+          <p:cNvPr id="61" name="Straight Connector 60"/>
+          <p:cNvCxnSpPr/>
+          <p:nvPr/>
+        </p:nvCxnSpPr>
+        <p:spPr>
+          <a:xfrm flipH="1" flipV="1">
+            <a:off x="547969" y="4027480"/>
+            <a:ext cx="3750328" cy="14706"/>
+          </a:xfrm>
+          <a:prstGeom prst="line">
+            <a:avLst/>
+          </a:prstGeom>
+          <a:ln w="38100"/>
+        </p:spPr>
+        <p:style>
+          <a:lnRef idx="1">
+            <a:schemeClr val="accent1"/>
+          </a:lnRef>
+          <a:fillRef idx="0">
+            <a:schemeClr val="accent1"/>
+          </a:fillRef>
+          <a:effectRef idx="0">
+            <a:schemeClr val="accent1"/>
+          </a:effectRef>
+          <a:fontRef idx="minor">
+            <a:schemeClr val="tx1"/>
+          </a:fontRef>
+        </p:style>
+      </p:cxnSp>
+      <p:cxnSp>
+        <p:nvCxnSpPr>
+          <p:cNvPr id="65" name="Straight Connector 64"/>
+          <p:cNvCxnSpPr/>
+          <p:nvPr/>
+        </p:nvCxnSpPr>
+        <p:spPr>
+          <a:xfrm flipV="1">
+            <a:off x="4287370" y="4042186"/>
+            <a:ext cx="21686" cy="2541873"/>
+          </a:xfrm>
+          <a:prstGeom prst="line">
+            <a:avLst/>
+          </a:prstGeom>
+          <a:ln w="38100"/>
+        </p:spPr>
+        <p:style>
+          <a:lnRef idx="1">
+            <a:schemeClr val="accent1"/>
+          </a:lnRef>
+          <a:fillRef idx="0">
+            <a:schemeClr val="accent1"/>
+          </a:fillRef>
+          <a:effectRef idx="0">
+            <a:schemeClr val="accent1"/>
+          </a:effectRef>
+          <a:fontRef idx="minor">
+            <a:schemeClr val="tx1"/>
+          </a:fontRef>
+        </p:style>
+      </p:cxnSp>
+      <p:cxnSp>
+        <p:nvCxnSpPr>
+          <p:cNvPr id="68" name="Straight Connector 67"/>
+          <p:cNvCxnSpPr/>
+          <p:nvPr/>
+        </p:nvCxnSpPr>
+        <p:spPr>
+          <a:xfrm>
+            <a:off x="805074" y="273844"/>
+            <a:ext cx="3874502" cy="30956"/>
+          </a:xfrm>
+          <a:prstGeom prst="line">
+            <a:avLst/>
+          </a:prstGeom>
+          <a:ln w="38100"/>
+        </p:spPr>
+        <p:style>
+          <a:lnRef idx="1">
+            <a:schemeClr val="dk1"/>
+          </a:lnRef>
+          <a:fillRef idx="0">
+            <a:schemeClr val="dk1"/>
+          </a:fillRef>
+          <a:effectRef idx="0">
+            <a:schemeClr val="dk1"/>
+          </a:effectRef>
+          <a:fontRef idx="minor">
+            <a:schemeClr val="tx1"/>
+          </a:fontRef>
+        </p:style>
+      </p:cxnSp>
+      <p:cxnSp>
+        <p:nvCxnSpPr>
+          <p:cNvPr id="72" name="Straight Connector 71"/>
+          <p:cNvCxnSpPr/>
+          <p:nvPr/>
+        </p:nvCxnSpPr>
+        <p:spPr>
+          <a:xfrm flipV="1">
+            <a:off x="796109" y="273844"/>
+            <a:ext cx="8965" cy="3612356"/>
+          </a:xfrm>
+          <a:prstGeom prst="line">
+            <a:avLst/>
+          </a:prstGeom>
+          <a:ln w="38100"/>
+        </p:spPr>
+        <p:style>
+          <a:lnRef idx="1">
+            <a:schemeClr val="dk1"/>
+          </a:lnRef>
+          <a:fillRef idx="0">
+            <a:schemeClr val="dk1"/>
+          </a:fillRef>
+          <a:effectRef idx="0">
+            <a:schemeClr val="dk1"/>
+          </a:effectRef>
+          <a:fontRef idx="minor">
+            <a:schemeClr val="tx1"/>
+          </a:fontRef>
+        </p:style>
+      </p:cxnSp>
+      <p:cxnSp>
+        <p:nvCxnSpPr>
+          <p:cNvPr id="75" name="Straight Connector 74"/>
+          <p:cNvCxnSpPr/>
+          <p:nvPr/>
+        </p:nvCxnSpPr>
+        <p:spPr>
+          <a:xfrm flipH="1" flipV="1">
+            <a:off x="796112" y="3886200"/>
+            <a:ext cx="3707060" cy="63511"/>
+          </a:xfrm>
+          <a:prstGeom prst="line">
+            <a:avLst/>
+          </a:prstGeom>
+          <a:ln w="38100"/>
+        </p:spPr>
+        <p:style>
+          <a:lnRef idx="1">
+            <a:schemeClr val="dk1"/>
+          </a:lnRef>
+          <a:fillRef idx="0">
+            <a:schemeClr val="dk1"/>
+          </a:fillRef>
+          <a:effectRef idx="0">
+            <a:schemeClr val="dk1"/>
+          </a:effectRef>
+          <a:fontRef idx="minor">
+            <a:schemeClr val="tx1"/>
+          </a:fontRef>
+        </p:style>
+      </p:cxnSp>
+      <p:cxnSp>
+        <p:nvCxnSpPr>
+          <p:cNvPr id="78" name="Straight Connector 77"/>
+          <p:cNvCxnSpPr/>
+          <p:nvPr/>
+        </p:nvCxnSpPr>
+        <p:spPr>
+          <a:xfrm flipH="1">
+            <a:off x="4494057" y="3924300"/>
+            <a:ext cx="9115" cy="2752234"/>
+          </a:xfrm>
+          <a:prstGeom prst="line">
+            <a:avLst/>
+          </a:prstGeom>
+          <a:ln w="38100"/>
+        </p:spPr>
+        <p:style>
+          <a:lnRef idx="1">
+            <a:schemeClr val="dk1"/>
+          </a:lnRef>
+          <a:fillRef idx="0">
+            <a:schemeClr val="dk1"/>
+          </a:fillRef>
+          <a:effectRef idx="0">
+            <a:schemeClr val="dk1"/>
+          </a:effectRef>
+          <a:fontRef idx="minor">
+            <a:schemeClr val="tx1"/>
+          </a:fontRef>
+        </p:style>
+      </p:cxnSp>
+      <p:cxnSp>
+        <p:nvCxnSpPr>
+          <p:cNvPr id="81" name="Straight Connector 80"/>
+          <p:cNvCxnSpPr/>
+          <p:nvPr/>
+        </p:nvCxnSpPr>
+        <p:spPr>
+          <a:xfrm>
+            <a:off x="1140007" y="143436"/>
+            <a:ext cx="3660593" cy="8964"/>
+          </a:xfrm>
+          <a:prstGeom prst="line">
+            <a:avLst/>
+          </a:prstGeom>
+          <a:ln w="38100"/>
+        </p:spPr>
+        <p:style>
+          <a:lnRef idx="1">
+            <a:schemeClr val="accent1"/>
+          </a:lnRef>
+          <a:fillRef idx="0">
+            <a:schemeClr val="accent1"/>
+          </a:fillRef>
+          <a:effectRef idx="0">
+            <a:schemeClr val="accent1"/>
+          </a:effectRef>
+          <a:fontRef idx="minor">
+            <a:schemeClr val="tx1"/>
+          </a:fontRef>
+        </p:style>
+      </p:cxnSp>
+      <p:cxnSp>
+        <p:nvCxnSpPr>
+          <p:cNvPr id="85" name="Straight Connector 84"/>
+          <p:cNvCxnSpPr/>
+          <p:nvPr/>
+        </p:nvCxnSpPr>
+        <p:spPr>
+          <a:xfrm flipV="1">
+            <a:off x="1140006" y="143437"/>
+            <a:ext cx="2" cy="3643118"/>
+          </a:xfrm>
+          <a:prstGeom prst="line">
+            <a:avLst/>
+          </a:prstGeom>
+          <a:ln w="38100"/>
+        </p:spPr>
+        <p:style>
+          <a:lnRef idx="1">
+            <a:schemeClr val="accent1"/>
+          </a:lnRef>
+          <a:fillRef idx="0">
+            <a:schemeClr val="accent1"/>
+          </a:fillRef>
+          <a:effectRef idx="0">
+            <a:schemeClr val="accent1"/>
+          </a:effectRef>
+          <a:fontRef idx="minor">
+            <a:schemeClr val="tx1"/>
+          </a:fontRef>
+        </p:style>
+      </p:cxnSp>
+      <p:cxnSp>
+        <p:nvCxnSpPr>
+          <p:cNvPr id="89" name="Straight Connector 88"/>
+          <p:cNvCxnSpPr/>
+          <p:nvPr/>
+        </p:nvCxnSpPr>
+        <p:spPr>
+          <a:xfrm flipH="1" flipV="1">
+            <a:off x="1140007" y="3786555"/>
+            <a:ext cx="3548534" cy="23445"/>
+          </a:xfrm>
+          <a:prstGeom prst="line">
+            <a:avLst/>
+          </a:prstGeom>
+          <a:ln w="38100"/>
+        </p:spPr>
+        <p:style>
+          <a:lnRef idx="1">
+            <a:schemeClr val="accent1"/>
+          </a:lnRef>
+          <a:fillRef idx="0">
+            <a:schemeClr val="accent1"/>
+          </a:fillRef>
+          <a:effectRef idx="0">
+            <a:schemeClr val="accent1"/>
+          </a:effectRef>
+          <a:fontRef idx="minor">
+            <a:schemeClr val="tx1"/>
+          </a:fontRef>
+        </p:style>
+      </p:cxnSp>
+      <p:cxnSp>
+        <p:nvCxnSpPr>
+          <p:cNvPr id="92" name="Straight Connector 91"/>
+          <p:cNvCxnSpPr/>
+          <p:nvPr/>
+        </p:nvCxnSpPr>
+        <p:spPr>
+          <a:xfrm flipV="1">
+            <a:off x="4676495" y="3798278"/>
+            <a:ext cx="16249" cy="3016562"/>
+          </a:xfrm>
+          <a:prstGeom prst="line">
+            <a:avLst/>
+          </a:prstGeom>
+          <a:ln w="38100"/>
+        </p:spPr>
+        <p:style>
+          <a:lnRef idx="1">
+            <a:schemeClr val="accent1"/>
+          </a:lnRef>
+          <a:fillRef idx="0">
+            <a:schemeClr val="accent1"/>
+          </a:fillRef>
+          <a:effectRef idx="0">
+            <a:schemeClr val="accent1"/>
+          </a:effectRef>
+          <a:fontRef idx="minor">
+            <a:schemeClr val="tx1"/>
+          </a:fontRef>
+        </p:style>
+      </p:cxnSp>
+      <p:cxnSp>
+        <p:nvCxnSpPr>
+          <p:cNvPr id="97" name="Straight Connector 96"/>
+          <p:cNvCxnSpPr/>
+          <p:nvPr/>
+        </p:nvCxnSpPr>
+        <p:spPr>
+          <a:xfrm flipH="1">
+            <a:off x="396261" y="5186978"/>
+            <a:ext cx="1257300" cy="0"/>
+          </a:xfrm>
+          <a:prstGeom prst="line">
+            <a:avLst/>
+          </a:prstGeom>
+          <a:ln w="38100"/>
+        </p:spPr>
+        <p:style>
+          <a:lnRef idx="1">
+            <a:schemeClr val="accent2"/>
+          </a:lnRef>
+          <a:fillRef idx="0">
+            <a:schemeClr val="accent2"/>
+          </a:fillRef>
+          <a:effectRef idx="0">
+            <a:schemeClr val="accent2"/>
+          </a:effectRef>
+          <a:fontRef idx="minor">
+            <a:schemeClr val="tx1"/>
+          </a:fontRef>
+        </p:style>
+      </p:cxnSp>
+      <p:cxnSp>
+        <p:nvCxnSpPr>
+          <p:cNvPr id="99" name="Straight Connector 98"/>
+          <p:cNvCxnSpPr/>
+          <p:nvPr/>
+        </p:nvCxnSpPr>
+        <p:spPr>
+          <a:xfrm flipH="1">
+            <a:off x="643958" y="5342965"/>
+            <a:ext cx="992095" cy="0"/>
+          </a:xfrm>
+          <a:prstGeom prst="line">
+            <a:avLst/>
+          </a:prstGeom>
+          <a:ln w="38100"/>
+        </p:spPr>
+        <p:style>
+          <a:lnRef idx="1">
+            <a:schemeClr val="dk1"/>
+          </a:lnRef>
+          <a:fillRef idx="0">
+            <a:schemeClr val="dk1"/>
+          </a:fillRef>
+          <a:effectRef idx="0">
+            <a:schemeClr val="dk1"/>
+          </a:effectRef>
+          <a:fontRef idx="minor">
+            <a:schemeClr val="tx1"/>
+          </a:fontRef>
+        </p:style>
+      </p:cxnSp>
+      <p:cxnSp>
+        <p:nvCxnSpPr>
+          <p:cNvPr id="105" name="Straight Connector 104"/>
+          <p:cNvCxnSpPr/>
+          <p:nvPr/>
+        </p:nvCxnSpPr>
+        <p:spPr>
+          <a:xfrm flipH="1" flipV="1">
+            <a:off x="638448" y="5342965"/>
+            <a:ext cx="8334" cy="1515035"/>
+          </a:xfrm>
+          <a:prstGeom prst="line">
+            <a:avLst/>
+          </a:prstGeom>
+          <a:ln w="38100"/>
+        </p:spPr>
+        <p:style>
+          <a:lnRef idx="1">
+            <a:schemeClr val="dk1"/>
+          </a:lnRef>
+          <a:fillRef idx="0">
+            <a:schemeClr val="dk1"/>
+          </a:fillRef>
+          <a:effectRef idx="0">
+            <a:schemeClr val="dk1"/>
+          </a:effectRef>
+          <a:fontRef idx="minor">
+            <a:schemeClr val="tx1"/>
+          </a:fontRef>
+        </p:style>
+      </p:cxnSp>
+      <p:cxnSp>
+        <p:nvCxnSpPr>
+          <p:cNvPr id="108" name="Straight Connector 107"/>
+          <p:cNvCxnSpPr/>
+          <p:nvPr/>
+        </p:nvCxnSpPr>
+        <p:spPr>
+          <a:xfrm flipH="1" flipV="1">
+            <a:off x="408445" y="5179169"/>
+            <a:ext cx="13165" cy="1678831"/>
+          </a:xfrm>
+          <a:prstGeom prst="line">
+            <a:avLst/>
+          </a:prstGeom>
+          <a:ln w="38100"/>
+        </p:spPr>
+        <p:style>
+          <a:lnRef idx="1">
+            <a:schemeClr val="accent2"/>
+          </a:lnRef>
+          <a:fillRef idx="0">
+            <a:schemeClr val="accent2"/>
+          </a:fillRef>
+          <a:effectRef idx="0">
+            <a:schemeClr val="accent2"/>
+          </a:effectRef>
+          <a:fontRef idx="minor">
+            <a:schemeClr val="tx1"/>
+          </a:fontRef>
+        </p:style>
+      </p:cxnSp>
+      <p:cxnSp>
+        <p:nvCxnSpPr>
+          <p:cNvPr id="120" name="Straight Connector 119"/>
+          <p:cNvCxnSpPr/>
+          <p:nvPr/>
+        </p:nvCxnSpPr>
+        <p:spPr>
+          <a:xfrm>
+            <a:off x="3244002" y="6584059"/>
+            <a:ext cx="1043368" cy="0"/>
+          </a:xfrm>
+          <a:prstGeom prst="line">
+            <a:avLst/>
+          </a:prstGeom>
+          <a:ln w="38100"/>
+        </p:spPr>
+        <p:style>
+          <a:lnRef idx="1">
+            <a:schemeClr val="accent1"/>
+          </a:lnRef>
+          <a:fillRef idx="0">
+            <a:schemeClr val="accent1"/>
+          </a:fillRef>
+          <a:effectRef idx="0">
+            <a:schemeClr val="accent1"/>
+          </a:effectRef>
+          <a:fontRef idx="minor">
+            <a:schemeClr val="tx1"/>
+          </a:fontRef>
+        </p:style>
+      </p:cxnSp>
+      <p:cxnSp>
+        <p:nvCxnSpPr>
+          <p:cNvPr id="130" name="Straight Connector 129"/>
+          <p:cNvCxnSpPr/>
+          <p:nvPr/>
+        </p:nvCxnSpPr>
+        <p:spPr>
+          <a:xfrm>
+            <a:off x="3039184" y="6668275"/>
+            <a:ext cx="1452992" cy="8259"/>
+          </a:xfrm>
+          <a:prstGeom prst="line">
+            <a:avLst/>
+          </a:prstGeom>
+          <a:ln w="38100"/>
+        </p:spPr>
+        <p:style>
+          <a:lnRef idx="1">
+            <a:schemeClr val="dk1"/>
+          </a:lnRef>
+          <a:fillRef idx="0">
+            <a:schemeClr val="dk1"/>
+          </a:fillRef>
+          <a:effectRef idx="0">
+            <a:schemeClr val="dk1"/>
+          </a:effectRef>
+          <a:fontRef idx="minor">
+            <a:schemeClr val="tx1"/>
+          </a:fontRef>
+        </p:style>
+      </p:cxnSp>
+      <p:cxnSp>
+        <p:nvCxnSpPr>
+          <p:cNvPr id="136" name="Straight Connector 135"/>
+          <p:cNvCxnSpPr/>
+          <p:nvPr/>
+        </p:nvCxnSpPr>
+        <p:spPr>
+          <a:xfrm>
+            <a:off x="2823743" y="6814840"/>
+            <a:ext cx="1860315" cy="0"/>
+          </a:xfrm>
+          <a:prstGeom prst="line">
+            <a:avLst/>
+          </a:prstGeom>
+          <a:ln w="38100"/>
+        </p:spPr>
+        <p:style>
+          <a:lnRef idx="1">
+            <a:schemeClr val="accent1"/>
+          </a:lnRef>
+          <a:fillRef idx="0">
+            <a:schemeClr val="accent1"/>
+          </a:fillRef>
+          <a:effectRef idx="0">
+            <a:schemeClr val="accent1"/>
+          </a:effectRef>
+          <a:fontRef idx="minor">
+            <a:schemeClr val="tx1"/>
+          </a:fontRef>
+        </p:style>
+      </p:cxnSp>
+      <p:cxnSp>
+        <p:nvCxnSpPr>
+          <p:cNvPr id="139" name="Straight Connector 138"/>
+          <p:cNvCxnSpPr/>
+          <p:nvPr/>
+        </p:nvCxnSpPr>
+        <p:spPr>
+          <a:xfrm flipH="1">
+            <a:off x="3257550" y="6100482"/>
+            <a:ext cx="16669" cy="483577"/>
+          </a:xfrm>
+          <a:prstGeom prst="line">
+            <a:avLst/>
+          </a:prstGeom>
+          <a:ln w="38100"/>
+        </p:spPr>
+        <p:style>
+          <a:lnRef idx="1">
+            <a:schemeClr val="accent1"/>
+          </a:lnRef>
+          <a:fillRef idx="0">
+            <a:schemeClr val="accent1"/>
+          </a:fillRef>
+          <a:effectRef idx="0">
+            <a:schemeClr val="accent1"/>
+          </a:effectRef>
+          <a:fontRef idx="minor">
+            <a:schemeClr val="tx1"/>
+          </a:fontRef>
+        </p:style>
+      </p:cxnSp>
+      <p:cxnSp>
+        <p:nvCxnSpPr>
+          <p:cNvPr id="143" name="Straight Connector 142"/>
+          <p:cNvCxnSpPr/>
+          <p:nvPr/>
+        </p:nvCxnSpPr>
+        <p:spPr>
+          <a:xfrm flipH="1">
+            <a:off x="3039184" y="6172200"/>
+            <a:ext cx="16875" cy="496075"/>
+          </a:xfrm>
+          <a:prstGeom prst="line">
+            <a:avLst/>
+          </a:prstGeom>
+          <a:ln w="38100"/>
+        </p:spPr>
+        <p:style>
+          <a:lnRef idx="1">
+            <a:schemeClr val="dk1"/>
+          </a:lnRef>
+          <a:fillRef idx="0">
+            <a:schemeClr val="dk1"/>
+          </a:fillRef>
+          <a:effectRef idx="0">
+            <a:schemeClr val="dk1"/>
+          </a:effectRef>
+          <a:fontRef idx="minor">
+            <a:schemeClr val="tx1"/>
+          </a:fontRef>
+        </p:style>
+      </p:cxnSp>
+      <p:cxnSp>
+        <p:nvCxnSpPr>
+          <p:cNvPr id="147" name="Straight Connector 146"/>
+          <p:cNvCxnSpPr/>
+          <p:nvPr/>
+        </p:nvCxnSpPr>
+        <p:spPr>
+          <a:xfrm flipV="1">
+            <a:off x="2851241" y="6172200"/>
+            <a:ext cx="14620" cy="642641"/>
+          </a:xfrm>
+          <a:prstGeom prst="line">
+            <a:avLst/>
+          </a:prstGeom>
+          <a:ln w="38100"/>
+        </p:spPr>
+        <p:style>
+          <a:lnRef idx="1">
+            <a:schemeClr val="accent1"/>
+          </a:lnRef>
+          <a:fillRef idx="0">
+            <a:schemeClr val="accent1"/>
+          </a:fillRef>
+          <a:effectRef idx="0">
+            <a:schemeClr val="accent1"/>
+          </a:effectRef>
+          <a:fontRef idx="minor">
+            <a:schemeClr val="tx1"/>
+          </a:fontRef>
+        </p:style>
+      </p:cxnSp>
+      <p:cxnSp>
+        <p:nvCxnSpPr>
+          <p:cNvPr id="155" name="Straight Connector 154"/>
+          <p:cNvCxnSpPr/>
+          <p:nvPr/>
+        </p:nvCxnSpPr>
+        <p:spPr>
+          <a:xfrm flipV="1">
+            <a:off x="5120480" y="2895602"/>
+            <a:ext cx="365920" cy="137926"/>
+          </a:xfrm>
+          <a:prstGeom prst="line">
+            <a:avLst/>
+          </a:prstGeom>
+          <a:ln w="38100"/>
+        </p:spPr>
+        <p:style>
+          <a:lnRef idx="1">
+            <a:schemeClr val="dk1"/>
+          </a:lnRef>
+          <a:fillRef idx="0">
+            <a:schemeClr val="dk1"/>
+          </a:fillRef>
+          <a:effectRef idx="0">
+            <a:schemeClr val="dk1"/>
+          </a:effectRef>
+          <a:fontRef idx="minor">
+            <a:schemeClr val="tx1"/>
+          </a:fontRef>
+        </p:style>
+      </p:cxnSp>
+      <p:cxnSp>
+        <p:nvCxnSpPr>
+          <p:cNvPr id="160" name="Straight Connector 159"/>
+          <p:cNvCxnSpPr/>
+          <p:nvPr/>
+        </p:nvCxnSpPr>
+        <p:spPr>
+          <a:xfrm>
+            <a:off x="5112940" y="2781114"/>
+            <a:ext cx="345142" cy="121628"/>
+          </a:xfrm>
+          <a:prstGeom prst="line">
+            <a:avLst/>
+          </a:prstGeom>
+          <a:ln w="38100"/>
+        </p:spPr>
+        <p:style>
+          <a:lnRef idx="1">
+            <a:schemeClr val="dk1"/>
+          </a:lnRef>
+          <a:fillRef idx="0">
+            <a:schemeClr val="dk1"/>
+          </a:fillRef>
+          <a:effectRef idx="0">
+            <a:schemeClr val="dk1"/>
+          </a:effectRef>
+          <a:fontRef idx="minor">
+            <a:schemeClr val="tx1"/>
+          </a:fontRef>
+        </p:style>
+      </p:cxnSp>
+      <p:sp>
+        <p:nvSpPr>
+          <p:cNvPr id="1038" name="TextBox 1037"/>
+          <p:cNvSpPr txBox="1"/>
+          <p:nvPr/>
+        </p:nvSpPr>
+        <p:spPr>
+          <a:xfrm>
+            <a:off x="1770591" y="1823323"/>
+            <a:ext cx="1772709" cy="646331"/>
+          </a:xfrm>
+          <a:prstGeom prst="rect">
+            <a:avLst/>
+          </a:prstGeom>
+          <a:noFill/>
+        </p:spPr>
+        <p:txBody>
+          <a:bodyPr wrap="square" rtlCol="0">
+            <a:spAutoFit/>
+          </a:bodyPr>
+          <a:lstStyle/>
+          <a:p>
+            <a:r>
+              <a:rPr lang="en-US" sz="3600" dirty="0" err="1" smtClean="0"/>
+              <a:t>Vmusic</a:t>
+            </a:r>
+            <a:endParaRPr lang="en-US" sz="3600" dirty="0"/>
+          </a:p>
+        </p:txBody>
+      </p:sp>
+      <p:sp>
+        <p:nvSpPr>
+          <p:cNvPr id="164" name="TextBox 163"/>
+          <p:cNvSpPr txBox="1"/>
+          <p:nvPr/>
+        </p:nvSpPr>
+        <p:spPr>
+          <a:xfrm>
+            <a:off x="6481167" y="118347"/>
+            <a:ext cx="1674909" cy="646331"/>
+          </a:xfrm>
+          <a:prstGeom prst="rect">
+            <a:avLst/>
+          </a:prstGeom>
+          <a:noFill/>
+        </p:spPr>
+        <p:txBody>
+          <a:bodyPr wrap="square" rtlCol="0">
+            <a:spAutoFit/>
+          </a:bodyPr>
+          <a:lstStyle/>
+          <a:p>
+            <a:r>
+              <a:rPr lang="en-US" sz="3600" dirty="0" smtClean="0"/>
+              <a:t>Arduino</a:t>
+            </a:r>
+            <a:endParaRPr lang="en-US" sz="3600" dirty="0"/>
+          </a:p>
+        </p:txBody>
+      </p:sp>
+      <p:sp>
+        <p:nvSpPr>
+          <p:cNvPr id="165" name="TextBox 164"/>
+          <p:cNvSpPr txBox="1"/>
+          <p:nvPr/>
+        </p:nvSpPr>
+        <p:spPr>
+          <a:xfrm>
+            <a:off x="1455706" y="4312542"/>
+            <a:ext cx="1923928" cy="646331"/>
+          </a:xfrm>
+          <a:prstGeom prst="rect">
+            <a:avLst/>
+          </a:prstGeom>
+          <a:solidFill>
+            <a:schemeClr val="tx1"/>
+          </a:solidFill>
+        </p:spPr>
+        <p:txBody>
+          <a:bodyPr wrap="square" rtlCol="0">
+            <a:spAutoFit/>
+          </a:bodyPr>
+          <a:lstStyle/>
+          <a:p>
+            <a:r>
+              <a:rPr lang="en-US" sz="3600" dirty="0" smtClean="0">
+                <a:solidFill>
+                  <a:schemeClr val="bg1"/>
+                </a:solidFill>
+              </a:rPr>
+              <a:t>Amplifier</a:t>
+            </a:r>
+            <a:endParaRPr lang="en-US" sz="3600" dirty="0">
+              <a:solidFill>
+                <a:schemeClr val="bg1"/>
+              </a:solidFill>
+            </a:endParaRPr>
+          </a:p>
+        </p:txBody>
+      </p:sp>
+      <p:sp>
+        <p:nvSpPr>
+          <p:cNvPr id="166" name="TextBox 165"/>
+          <p:cNvSpPr txBox="1"/>
+          <p:nvPr/>
+        </p:nvSpPr>
+        <p:spPr>
+          <a:xfrm>
+            <a:off x="6602521" y="5885491"/>
+            <a:ext cx="1623486" cy="646331"/>
+          </a:xfrm>
+          <a:prstGeom prst="rect">
+            <a:avLst/>
+          </a:prstGeom>
+          <a:solidFill>
+            <a:schemeClr val="tx1"/>
+          </a:solidFill>
+        </p:spPr>
+        <p:txBody>
+          <a:bodyPr wrap="square" rtlCol="0">
+            <a:spAutoFit/>
+          </a:bodyPr>
+          <a:lstStyle/>
+          <a:p>
+            <a:r>
+              <a:rPr lang="en-US" sz="3600" dirty="0" err="1" smtClean="0">
+                <a:solidFill>
+                  <a:schemeClr val="bg1"/>
+                </a:solidFill>
+              </a:rPr>
+              <a:t>Vmusic</a:t>
+            </a:r>
+            <a:endParaRPr lang="en-US" sz="3600" dirty="0">
+              <a:solidFill>
+                <a:schemeClr val="bg1"/>
+              </a:solidFill>
+            </a:endParaRPr>
+          </a:p>
+        </p:txBody>
+      </p:sp>
     </p:spTree>
+  </p:cSld>
+  <p:clrMapOvr>
+    <a:masterClrMapping/>
+  </p:clrMapOvr>
+</p:sld>
+</file>
+
+<file path=ppt/slides/slide2.xml><?xml version="1.0" encoding="utf-8"?>
+<p:sld xmlns:a="http://schemas.openxmlformats.org/drawingml/2006/main" xmlns:r="http://schemas.openxmlformats.org/officeDocument/2006/relationships" xmlns:p="http://schemas.openxmlformats.org/presentationml/2006/main">
+  <p:cSld>
+    <p:spTree>
+      <p:nvGrpSpPr>
+        <p:cNvPr id="1" name=""/>
+        <p:cNvGrpSpPr/>
+        <p:nvPr/>
+      </p:nvGrpSpPr>
+      <p:grpSpPr>
+        <a:xfrm>
+          <a:off x="0" y="0"/>
+          <a:ext cx="0" cy="0"/>
+          <a:chOff x="0" y="0"/>
+          <a:chExt cx="0" cy="0"/>
+        </a:xfrm>
+      </p:grpSpPr>
+      <p:cxnSp>
+        <p:nvCxnSpPr>
+          <p:cNvPr id="3" name="Straight Connector 2"/>
+          <p:cNvCxnSpPr/>
+          <p:nvPr/>
+        </p:nvCxnSpPr>
+        <p:spPr>
+          <a:xfrm>
+            <a:off x="1371600" y="1828800"/>
+            <a:ext cx="990600" cy="0"/>
+          </a:xfrm>
+          <a:prstGeom prst="line">
+            <a:avLst/>
+          </a:prstGeom>
+          <a:ln w="38100"/>
+        </p:spPr>
+        <p:style>
+          <a:lnRef idx="1">
+            <a:schemeClr val="accent1"/>
+          </a:lnRef>
+          <a:fillRef idx="0">
+            <a:schemeClr val="accent1"/>
+          </a:fillRef>
+          <a:effectRef idx="0">
+            <a:schemeClr val="accent1"/>
+          </a:effectRef>
+          <a:fontRef idx="minor">
+            <a:schemeClr val="tx1"/>
+          </a:fontRef>
+        </p:style>
+      </p:cxnSp>
+      <p:cxnSp>
+        <p:nvCxnSpPr>
+          <p:cNvPr id="4" name="Straight Connector 3"/>
+          <p:cNvCxnSpPr/>
+          <p:nvPr/>
+        </p:nvCxnSpPr>
+        <p:spPr>
+          <a:xfrm>
+            <a:off x="1371600" y="2743200"/>
+            <a:ext cx="990600" cy="0"/>
+          </a:xfrm>
+          <a:prstGeom prst="line">
+            <a:avLst/>
+          </a:prstGeom>
+          <a:ln w="38100"/>
+        </p:spPr>
+        <p:style>
+          <a:lnRef idx="1">
+            <a:schemeClr val="dk1"/>
+          </a:lnRef>
+          <a:fillRef idx="0">
+            <a:schemeClr val="dk1"/>
+          </a:fillRef>
+          <a:effectRef idx="0">
+            <a:schemeClr val="dk1"/>
+          </a:effectRef>
+          <a:fontRef idx="minor">
+            <a:schemeClr val="tx1"/>
+          </a:fontRef>
+        </p:style>
+      </p:cxnSp>
+      <p:cxnSp>
+        <p:nvCxnSpPr>
+          <p:cNvPr id="7" name="Straight Connector 6"/>
+          <p:cNvCxnSpPr/>
+          <p:nvPr/>
+        </p:nvCxnSpPr>
+        <p:spPr>
+          <a:xfrm>
+            <a:off x="1371600" y="4648200"/>
+            <a:ext cx="990600" cy="0"/>
+          </a:xfrm>
+          <a:prstGeom prst="line">
+            <a:avLst/>
+          </a:prstGeom>
+          <a:ln w="38100"/>
+        </p:spPr>
+        <p:style>
+          <a:lnRef idx="1">
+            <a:schemeClr val="accent3"/>
+          </a:lnRef>
+          <a:fillRef idx="0">
+            <a:schemeClr val="accent3"/>
+          </a:fillRef>
+          <a:effectRef idx="0">
+            <a:schemeClr val="accent3"/>
+          </a:effectRef>
+          <a:fontRef idx="minor">
+            <a:schemeClr val="tx1"/>
+          </a:fontRef>
+        </p:style>
+      </p:cxnSp>
+      <p:cxnSp>
+        <p:nvCxnSpPr>
+          <p:cNvPr id="8" name="Straight Connector 7"/>
+          <p:cNvCxnSpPr/>
+          <p:nvPr/>
+        </p:nvCxnSpPr>
+        <p:spPr>
+          <a:xfrm>
+            <a:off x="1371600" y="3657600"/>
+            <a:ext cx="990600" cy="0"/>
+          </a:xfrm>
+          <a:prstGeom prst="line">
+            <a:avLst/>
+          </a:prstGeom>
+          <a:ln w="38100"/>
+        </p:spPr>
+        <p:style>
+          <a:lnRef idx="1">
+            <a:schemeClr val="accent2"/>
+          </a:lnRef>
+          <a:fillRef idx="0">
+            <a:schemeClr val="accent2"/>
+          </a:fillRef>
+          <a:effectRef idx="0">
+            <a:schemeClr val="accent2"/>
+          </a:effectRef>
+          <a:fontRef idx="minor">
+            <a:schemeClr val="tx1"/>
+          </a:fontRef>
+        </p:style>
+      </p:cxnSp>
+      <p:cxnSp>
+        <p:nvCxnSpPr>
+          <p:cNvPr id="11" name="Straight Connector 10"/>
+          <p:cNvCxnSpPr/>
+          <p:nvPr/>
+        </p:nvCxnSpPr>
+        <p:spPr>
+          <a:xfrm>
+            <a:off x="1371600" y="5486400"/>
+            <a:ext cx="990600" cy="0"/>
+          </a:xfrm>
+          <a:prstGeom prst="line">
+            <a:avLst/>
+          </a:prstGeom>
+          <a:ln w="38100"/>
+        </p:spPr>
+        <p:style>
+          <a:lnRef idx="1">
+            <a:schemeClr val="accent4"/>
+          </a:lnRef>
+          <a:fillRef idx="0">
+            <a:schemeClr val="accent4"/>
+          </a:fillRef>
+          <a:effectRef idx="0">
+            <a:schemeClr val="accent4"/>
+          </a:effectRef>
+          <a:fontRef idx="minor">
+            <a:schemeClr val="tx1"/>
+          </a:fontRef>
+        </p:style>
+      </p:cxnSp>
+      <p:cxnSp>
+        <p:nvCxnSpPr>
+          <p:cNvPr id="15" name="Straight Connector 14"/>
+          <p:cNvCxnSpPr/>
+          <p:nvPr/>
+        </p:nvCxnSpPr>
+        <p:spPr>
+          <a:xfrm>
+            <a:off x="1371600" y="6324600"/>
+            <a:ext cx="990600" cy="0"/>
+          </a:xfrm>
+          <a:prstGeom prst="line">
+            <a:avLst/>
+          </a:prstGeom>
+          <a:ln w="38100"/>
+        </p:spPr>
+        <p:style>
+          <a:lnRef idx="1">
+            <a:schemeClr val="accent6"/>
+          </a:lnRef>
+          <a:fillRef idx="0">
+            <a:schemeClr val="accent6"/>
+          </a:fillRef>
+          <a:effectRef idx="0">
+            <a:schemeClr val="accent6"/>
+          </a:effectRef>
+          <a:fontRef idx="minor">
+            <a:schemeClr val="tx1"/>
+          </a:fontRef>
+        </p:style>
+      </p:cxnSp>
+      <p:sp>
+        <p:nvSpPr>
+          <p:cNvPr id="16" name="TextBox 15"/>
+          <p:cNvSpPr txBox="1"/>
+          <p:nvPr/>
+        </p:nvSpPr>
+        <p:spPr>
+          <a:xfrm>
+            <a:off x="3352800" y="304800"/>
+            <a:ext cx="2514600" cy="923330"/>
+          </a:xfrm>
+          <a:prstGeom prst="rect">
+            <a:avLst/>
+          </a:prstGeom>
+          <a:noFill/>
+        </p:spPr>
+        <p:txBody>
+          <a:bodyPr wrap="square" rtlCol="0">
+            <a:spAutoFit/>
+          </a:bodyPr>
+          <a:lstStyle/>
+          <a:p>
+            <a:pPr algn="ctr"/>
+            <a:r>
+              <a:rPr lang="en-US" sz="5400" b="1" dirty="0" smtClean="0"/>
+              <a:t>Key</a:t>
+            </a:r>
+            <a:endParaRPr lang="en-US" sz="5400" b="1" dirty="0"/>
+          </a:p>
+        </p:txBody>
+      </p:sp>
+      <p:sp>
+        <p:nvSpPr>
+          <p:cNvPr id="18" name="TextBox 17"/>
+          <p:cNvSpPr txBox="1"/>
+          <p:nvPr/>
+        </p:nvSpPr>
+        <p:spPr>
+          <a:xfrm>
+            <a:off x="2438400" y="1567190"/>
+            <a:ext cx="4920343" cy="523220"/>
+          </a:xfrm>
+          <a:prstGeom prst="rect">
+            <a:avLst/>
+          </a:prstGeom>
+          <a:noFill/>
+        </p:spPr>
+        <p:txBody>
+          <a:bodyPr wrap="square" rtlCol="0">
+            <a:spAutoFit/>
+          </a:bodyPr>
+          <a:lstStyle/>
+          <a:p>
+            <a:r>
+              <a:rPr lang="en-US" sz="2800" b="1" dirty="0" smtClean="0"/>
+              <a:t>= Misc. wires from the </a:t>
+            </a:r>
+            <a:r>
+              <a:rPr lang="en-US" sz="2800" b="1" dirty="0" err="1" smtClean="0"/>
+              <a:t>Vmusic</a:t>
+            </a:r>
+            <a:endParaRPr lang="en-US" sz="2800" b="1" dirty="0"/>
+          </a:p>
+        </p:txBody>
+      </p:sp>
+      <p:sp>
+        <p:nvSpPr>
+          <p:cNvPr id="19" name="TextBox 18"/>
+          <p:cNvSpPr txBox="1"/>
+          <p:nvPr/>
+        </p:nvSpPr>
+        <p:spPr>
+          <a:xfrm>
+            <a:off x="2438400" y="2481590"/>
+            <a:ext cx="4920343" cy="523220"/>
+          </a:xfrm>
+          <a:prstGeom prst="rect">
+            <a:avLst/>
+          </a:prstGeom>
+          <a:noFill/>
+        </p:spPr>
+        <p:txBody>
+          <a:bodyPr wrap="square" rtlCol="0">
+            <a:spAutoFit/>
+          </a:bodyPr>
+          <a:lstStyle/>
+          <a:p>
+            <a:r>
+              <a:rPr lang="en-US" sz="2800" b="1" dirty="0" smtClean="0"/>
+              <a:t>= Ground wires (negative)</a:t>
+            </a:r>
+            <a:endParaRPr lang="en-US" sz="2800" b="1" dirty="0"/>
+          </a:p>
+        </p:txBody>
+      </p:sp>
+      <p:sp>
+        <p:nvSpPr>
+          <p:cNvPr id="20" name="TextBox 19"/>
+          <p:cNvSpPr txBox="1"/>
+          <p:nvPr/>
+        </p:nvSpPr>
+        <p:spPr>
+          <a:xfrm>
+            <a:off x="2438399" y="3453694"/>
+            <a:ext cx="4920343" cy="523220"/>
+          </a:xfrm>
+          <a:prstGeom prst="rect">
+            <a:avLst/>
+          </a:prstGeom>
+          <a:noFill/>
+        </p:spPr>
+        <p:txBody>
+          <a:bodyPr wrap="square" rtlCol="0">
+            <a:spAutoFit/>
+          </a:bodyPr>
+          <a:lstStyle/>
+          <a:p>
+            <a:r>
+              <a:rPr lang="en-US" sz="2800" b="1" dirty="0" smtClean="0"/>
+              <a:t>= Power (positive)</a:t>
+            </a:r>
+            <a:endParaRPr lang="en-US" sz="2800" b="1" dirty="0"/>
+          </a:p>
+        </p:txBody>
+      </p:sp>
+      <p:sp>
+        <p:nvSpPr>
+          <p:cNvPr id="21" name="TextBox 20"/>
+          <p:cNvSpPr txBox="1"/>
+          <p:nvPr/>
+        </p:nvSpPr>
+        <p:spPr>
+          <a:xfrm>
+            <a:off x="2438399" y="4386590"/>
+            <a:ext cx="4920343" cy="523220"/>
+          </a:xfrm>
+          <a:prstGeom prst="rect">
+            <a:avLst/>
+          </a:prstGeom>
+          <a:noFill/>
+        </p:spPr>
+        <p:txBody>
+          <a:bodyPr wrap="square" rtlCol="0">
+            <a:spAutoFit/>
+          </a:bodyPr>
+          <a:lstStyle/>
+          <a:p>
+            <a:r>
+              <a:rPr lang="en-US" sz="2800" b="1" dirty="0" smtClean="0"/>
+              <a:t>= Transmitting wires</a:t>
+            </a:r>
+            <a:endParaRPr lang="en-US" sz="2800" b="1" dirty="0"/>
+          </a:p>
+        </p:txBody>
+      </p:sp>
+      <p:sp>
+        <p:nvSpPr>
+          <p:cNvPr id="22" name="TextBox 21"/>
+          <p:cNvSpPr txBox="1"/>
+          <p:nvPr/>
+        </p:nvSpPr>
+        <p:spPr>
+          <a:xfrm>
+            <a:off x="2438399" y="5224790"/>
+            <a:ext cx="4920343" cy="523220"/>
+          </a:xfrm>
+          <a:prstGeom prst="rect">
+            <a:avLst/>
+          </a:prstGeom>
+          <a:noFill/>
+        </p:spPr>
+        <p:txBody>
+          <a:bodyPr wrap="square" rtlCol="0">
+            <a:spAutoFit/>
+          </a:bodyPr>
+          <a:lstStyle/>
+          <a:p>
+            <a:r>
+              <a:rPr lang="en-US" sz="2800" b="1" dirty="0" smtClean="0"/>
+              <a:t>= Receiving wires</a:t>
+            </a:r>
+            <a:endParaRPr lang="en-US" sz="2800" b="1" dirty="0"/>
+          </a:p>
+        </p:txBody>
+      </p:sp>
+      <p:sp>
+        <p:nvSpPr>
+          <p:cNvPr id="23" name="TextBox 22"/>
+          <p:cNvSpPr txBox="1"/>
+          <p:nvPr/>
+        </p:nvSpPr>
+        <p:spPr>
+          <a:xfrm>
+            <a:off x="2438398" y="6062990"/>
+            <a:ext cx="6705602" cy="523220"/>
+          </a:xfrm>
+          <a:prstGeom prst="rect">
+            <a:avLst/>
+          </a:prstGeom>
+          <a:noFill/>
+        </p:spPr>
+        <p:txBody>
+          <a:bodyPr wrap="square" rtlCol="0">
+            <a:spAutoFit/>
+          </a:bodyPr>
+          <a:lstStyle/>
+          <a:p>
+            <a:r>
+              <a:rPr lang="en-US" sz="2800" b="1" dirty="0" smtClean="0"/>
+              <a:t>= Misc. wires from the </a:t>
+            </a:r>
+            <a:r>
+              <a:rPr lang="en-US" sz="2800" b="1" dirty="0" err="1" smtClean="0"/>
+              <a:t>touchsensor</a:t>
+            </a:r>
+            <a:endParaRPr lang="en-US" sz="2800" b="1" dirty="0"/>
+          </a:p>
+        </p:txBody>
+      </p:sp>
+    </p:spTree>
+    <p:extLst>
+      <p:ext uri="{BB962C8B-B14F-4D97-AF65-F5344CB8AC3E}">
+        <p14:creationId xmlns:p14="http://schemas.microsoft.com/office/powerpoint/2010/main" val="450514726"/>
+      </p:ext>
+    </p:extLst>
   </p:cSld>
   <p:clrMapOvr>
     <a:masterClrMapping/>

</xml_diff>

<commit_message>
Adjusted the wires that go to the analog pins on the Arduino.
</commit_message>
<xml_diff>
--- a/ChaprSVN/ChapX/Wiring Diagram.pptx
+++ b/ChaprSVN/ChapX/Wiring Diagram.pptx
@@ -107,7 +107,7 @@
   </p:defaultTextStyle>
   <p:extLst>
     <p:ext uri="{EFAFB233-063F-42B5-8137-9DF3F51BA10A}">
-      <p15:sldGuideLst xmlns:p15="http://schemas.microsoft.com/office/powerpoint/2012/main">
+      <p15:sldGuideLst xmlns="" xmlns:p15="http://schemas.microsoft.com/office/powerpoint/2012/main">
         <p15:guide id="1" orient="horz" pos="2160">
           <p15:clr>
             <a:srgbClr val="A4A3A4"/>
@@ -305,7 +305,8 @@
           <a:p>
             <a:fld id="{A993F05E-E33D-45D4-B7DC-85158D89E11A}" type="datetimeFigureOut">
               <a:rPr lang="en-US" smtClean="0"/>
-              <a:t>1/25/2015</a:t>
+              <a:pPr/>
+              <a:t>2/3/2015</a:t>
             </a:fld>
             <a:endParaRPr lang="en-US"/>
           </a:p>
@@ -347,6 +348,7 @@
           <a:p>
             <a:fld id="{89F956D0-9F91-4EE6-A2CE-074591E4A77B}" type="slidenum">
               <a:rPr lang="en-US" smtClean="0"/>
+              <a:pPr/>
               <a:t>‹#›</a:t>
             </a:fld>
             <a:endParaRPr lang="en-US"/>
@@ -470,7 +472,8 @@
           <a:p>
             <a:fld id="{A993F05E-E33D-45D4-B7DC-85158D89E11A}" type="datetimeFigureOut">
               <a:rPr lang="en-US" smtClean="0"/>
-              <a:t>1/25/2015</a:t>
+              <a:pPr/>
+              <a:t>2/3/2015</a:t>
             </a:fld>
             <a:endParaRPr lang="en-US"/>
           </a:p>
@@ -512,6 +515,7 @@
           <a:p>
             <a:fld id="{89F956D0-9F91-4EE6-A2CE-074591E4A77B}" type="slidenum">
               <a:rPr lang="en-US" smtClean="0"/>
+              <a:pPr/>
               <a:t>‹#›</a:t>
             </a:fld>
             <a:endParaRPr lang="en-US"/>
@@ -645,7 +649,8 @@
           <a:p>
             <a:fld id="{A993F05E-E33D-45D4-B7DC-85158D89E11A}" type="datetimeFigureOut">
               <a:rPr lang="en-US" smtClean="0"/>
-              <a:t>1/25/2015</a:t>
+              <a:pPr/>
+              <a:t>2/3/2015</a:t>
             </a:fld>
             <a:endParaRPr lang="en-US"/>
           </a:p>
@@ -687,6 +692,7 @@
           <a:p>
             <a:fld id="{89F956D0-9F91-4EE6-A2CE-074591E4A77B}" type="slidenum">
               <a:rPr lang="en-US" smtClean="0"/>
+              <a:pPr/>
               <a:t>‹#›</a:t>
             </a:fld>
             <a:endParaRPr lang="en-US"/>
@@ -810,7 +816,8 @@
           <a:p>
             <a:fld id="{A993F05E-E33D-45D4-B7DC-85158D89E11A}" type="datetimeFigureOut">
               <a:rPr lang="en-US" smtClean="0"/>
-              <a:t>1/25/2015</a:t>
+              <a:pPr/>
+              <a:t>2/3/2015</a:t>
             </a:fld>
             <a:endParaRPr lang="en-US"/>
           </a:p>
@@ -852,6 +859,7 @@
           <a:p>
             <a:fld id="{89F956D0-9F91-4EE6-A2CE-074591E4A77B}" type="slidenum">
               <a:rPr lang="en-US" smtClean="0"/>
+              <a:pPr/>
               <a:t>‹#›</a:t>
             </a:fld>
             <a:endParaRPr lang="en-US"/>
@@ -1051,7 +1059,8 @@
           <a:p>
             <a:fld id="{A993F05E-E33D-45D4-B7DC-85158D89E11A}" type="datetimeFigureOut">
               <a:rPr lang="en-US" smtClean="0"/>
-              <a:t>1/25/2015</a:t>
+              <a:pPr/>
+              <a:t>2/3/2015</a:t>
             </a:fld>
             <a:endParaRPr lang="en-US"/>
           </a:p>
@@ -1093,6 +1102,7 @@
           <a:p>
             <a:fld id="{89F956D0-9F91-4EE6-A2CE-074591E4A77B}" type="slidenum">
               <a:rPr lang="en-US" smtClean="0"/>
+              <a:pPr/>
               <a:t>‹#›</a:t>
             </a:fld>
             <a:endParaRPr lang="en-US"/>
@@ -1334,7 +1344,8 @@
           <a:p>
             <a:fld id="{A993F05E-E33D-45D4-B7DC-85158D89E11A}" type="datetimeFigureOut">
               <a:rPr lang="en-US" smtClean="0"/>
-              <a:t>1/25/2015</a:t>
+              <a:pPr/>
+              <a:t>2/3/2015</a:t>
             </a:fld>
             <a:endParaRPr lang="en-US"/>
           </a:p>
@@ -1376,6 +1387,7 @@
           <a:p>
             <a:fld id="{89F956D0-9F91-4EE6-A2CE-074591E4A77B}" type="slidenum">
               <a:rPr lang="en-US" smtClean="0"/>
+              <a:pPr/>
               <a:t>‹#›</a:t>
             </a:fld>
             <a:endParaRPr lang="en-US"/>
@@ -1751,7 +1763,8 @@
           <a:p>
             <a:fld id="{A993F05E-E33D-45D4-B7DC-85158D89E11A}" type="datetimeFigureOut">
               <a:rPr lang="en-US" smtClean="0"/>
-              <a:t>1/25/2015</a:t>
+              <a:pPr/>
+              <a:t>2/3/2015</a:t>
             </a:fld>
             <a:endParaRPr lang="en-US"/>
           </a:p>
@@ -1793,6 +1806,7 @@
           <a:p>
             <a:fld id="{89F956D0-9F91-4EE6-A2CE-074591E4A77B}" type="slidenum">
               <a:rPr lang="en-US" smtClean="0"/>
+              <a:pPr/>
               <a:t>‹#›</a:t>
             </a:fld>
             <a:endParaRPr lang="en-US"/>
@@ -1864,7 +1878,8 @@
           <a:p>
             <a:fld id="{A993F05E-E33D-45D4-B7DC-85158D89E11A}" type="datetimeFigureOut">
               <a:rPr lang="en-US" smtClean="0"/>
-              <a:t>1/25/2015</a:t>
+              <a:pPr/>
+              <a:t>2/3/2015</a:t>
             </a:fld>
             <a:endParaRPr lang="en-US"/>
           </a:p>
@@ -1906,6 +1921,7 @@
           <a:p>
             <a:fld id="{89F956D0-9F91-4EE6-A2CE-074591E4A77B}" type="slidenum">
               <a:rPr lang="en-US" smtClean="0"/>
+              <a:pPr/>
               <a:t>‹#›</a:t>
             </a:fld>
             <a:endParaRPr lang="en-US"/>
@@ -1954,7 +1970,8 @@
           <a:p>
             <a:fld id="{A993F05E-E33D-45D4-B7DC-85158D89E11A}" type="datetimeFigureOut">
               <a:rPr lang="en-US" smtClean="0"/>
-              <a:t>1/25/2015</a:t>
+              <a:pPr/>
+              <a:t>2/3/2015</a:t>
             </a:fld>
             <a:endParaRPr lang="en-US"/>
           </a:p>
@@ -1996,6 +2013,7 @@
           <a:p>
             <a:fld id="{89F956D0-9F91-4EE6-A2CE-074591E4A77B}" type="slidenum">
               <a:rPr lang="en-US" smtClean="0"/>
+              <a:pPr/>
               <a:t>‹#›</a:t>
             </a:fld>
             <a:endParaRPr lang="en-US"/>
@@ -2226,7 +2244,8 @@
           <a:p>
             <a:fld id="{A993F05E-E33D-45D4-B7DC-85158D89E11A}" type="datetimeFigureOut">
               <a:rPr lang="en-US" smtClean="0"/>
-              <a:t>1/25/2015</a:t>
+              <a:pPr/>
+              <a:t>2/3/2015</a:t>
             </a:fld>
             <a:endParaRPr lang="en-US"/>
           </a:p>
@@ -2268,6 +2287,7 @@
           <a:p>
             <a:fld id="{89F956D0-9F91-4EE6-A2CE-074591E4A77B}" type="slidenum">
               <a:rPr lang="en-US" smtClean="0"/>
+              <a:pPr/>
               <a:t>‹#›</a:t>
             </a:fld>
             <a:endParaRPr lang="en-US"/>
@@ -2474,7 +2494,8 @@
           <a:p>
             <a:fld id="{A993F05E-E33D-45D4-B7DC-85158D89E11A}" type="datetimeFigureOut">
               <a:rPr lang="en-US" smtClean="0"/>
-              <a:t>1/25/2015</a:t>
+              <a:pPr/>
+              <a:t>2/3/2015</a:t>
             </a:fld>
             <a:endParaRPr lang="en-US"/>
           </a:p>
@@ -2516,6 +2537,7 @@
           <a:p>
             <a:fld id="{89F956D0-9F91-4EE6-A2CE-074591E4A77B}" type="slidenum">
               <a:rPr lang="en-US" smtClean="0"/>
+              <a:pPr/>
               <a:t>‹#›</a:t>
             </a:fld>
             <a:endParaRPr lang="en-US"/>
@@ -2682,7 +2704,8 @@
           <a:p>
             <a:fld id="{A993F05E-E33D-45D4-B7DC-85158D89E11A}" type="datetimeFigureOut">
               <a:rPr lang="en-US" smtClean="0"/>
-              <a:t>1/25/2015</a:t>
+              <a:pPr/>
+              <a:t>2/3/2015</a:t>
             </a:fld>
             <a:endParaRPr lang="en-US"/>
           </a:p>
@@ -2760,6 +2783,7 @@
           <a:p>
             <a:fld id="{89F956D0-9F91-4EE6-A2CE-074591E4A77B}" type="slidenum">
               <a:rPr lang="en-US" smtClean="0"/>
+              <a:pPr/>
               <a:t>‹#›</a:t>
             </a:fld>
             <a:endParaRPr lang="en-US"/>
@@ -4141,8 +4165,8 @@
         </p:nvCxnSpPr>
         <p:spPr>
           <a:xfrm flipH="1">
-            <a:off x="5862918" y="2783681"/>
-            <a:ext cx="2101" cy="2362060"/>
+            <a:off x="5862919" y="2425700"/>
+            <a:ext cx="4481" cy="2707341"/>
           </a:xfrm>
           <a:prstGeom prst="line">
             <a:avLst/>
@@ -4171,9 +4195,9 @@
           <p:nvPr/>
         </p:nvCxnSpPr>
         <p:spPr>
-          <a:xfrm flipV="1">
-            <a:off x="5850731" y="2796989"/>
-            <a:ext cx="1105881" cy="980"/>
+          <a:xfrm>
+            <a:off x="5867400" y="2438400"/>
+            <a:ext cx="1066352" cy="0"/>
           </a:xfrm>
           <a:prstGeom prst="line">
             <a:avLst/>
@@ -4234,8 +4258,8 @@
         </p:nvCxnSpPr>
         <p:spPr>
           <a:xfrm flipV="1">
-            <a:off x="5715000" y="2667000"/>
-            <a:ext cx="0" cy="2667000"/>
+            <a:off x="5715000" y="2235200"/>
+            <a:ext cx="0" cy="3124200"/>
           </a:xfrm>
           <a:prstGeom prst="line">
             <a:avLst/>
@@ -4265,7 +4289,7 @@
         </p:nvCxnSpPr>
         <p:spPr>
           <a:xfrm>
-            <a:off x="5715000" y="2686050"/>
+            <a:off x="5695950" y="2247900"/>
             <a:ext cx="1238250" cy="0"/>
           </a:xfrm>
           <a:prstGeom prst="line">
@@ -4421,7 +4445,7 @@
           <p:nvPr/>
         </p:nvPicPr>
         <p:blipFill rotWithShape="1">
-          <a:blip r:embed="rId5"/>
+          <a:blip r:embed="rId5" cstate="print"/>
           <a:srcRect t="10586" r="13176" b="25897"/>
           <a:stretch/>
         </p:blipFill>
@@ -5287,15 +5311,13 @@
         </p:nvSpPr>
         <p:spPr>
           <a:xfrm>
-            <a:off x="6602521" y="5885491"/>
-            <a:ext cx="1623486" cy="646331"/>
+            <a:off x="6096000" y="6287869"/>
+            <a:ext cx="2743200" cy="646331"/>
           </a:xfrm>
           <a:prstGeom prst="rect">
             <a:avLst/>
           </a:prstGeom>
-          <a:solidFill>
-            <a:schemeClr val="tx1"/>
-          </a:solidFill>
+          <a:noFill/>
         </p:spPr>
         <p:txBody>
           <a:bodyPr wrap="square" rtlCol="0">
@@ -5304,18 +5326,10 @@
           <a:lstStyle/>
           <a:p>
             <a:r>
-              <a:rPr lang="en-US" sz="3600" dirty="0" err="1" smtClean="0">
-                <a:solidFill>
-                  <a:schemeClr val="bg1"/>
-                </a:solidFill>
-              </a:rPr>
-              <a:t>Vmusic</a:t>
-            </a:r>
-            <a:endParaRPr lang="en-US" sz="3600" dirty="0">
-              <a:solidFill>
-                <a:schemeClr val="bg1"/>
-              </a:solidFill>
-            </a:endParaRPr>
+              <a:rPr lang="en-US" sz="3600" dirty="0" err="1" smtClean="0"/>
+              <a:t>TouchSensor</a:t>
+            </a:r>
+            <a:endParaRPr lang="en-US" sz="3600" dirty="0"/>
           </a:p>
         </p:txBody>
       </p:sp>
@@ -5752,7 +5766,7 @@
     </p:spTree>
     <p:extLst>
       <p:ext uri="{BB962C8B-B14F-4D97-AF65-F5344CB8AC3E}">
-        <p14:creationId xmlns:p14="http://schemas.microsoft.com/office/powerpoint/2010/main" val="450514726"/>
+        <p14:creationId xmlns="" xmlns:p14="http://schemas.microsoft.com/office/powerpoint/2010/main" val="450514726"/>
       </p:ext>
     </p:extLst>
   </p:cSld>

</xml_diff>